<commit_message>
add: first full presentation realisation
</commit_message>
<xml_diff>
--- a/doc/presentation.pptx
+++ b/doc/presentation.pptx
@@ -9824,12 +9824,15 @@
             </a:r>
             <a:r>
               <a:rPr lang="ru-RU" dirty="0"/>
-              <a:t>данных для шейдеров)</a:t>
+              <a:t>данных для шейдеров) – создание, удаление</a:t>
             </a:r>
           </a:p>
           <a:p>
             <a:pPr lvl="2"/>
-            <a:endParaRPr lang="ru-RU" dirty="0"/>
+            <a:r>
+              <a:rPr lang="ru-RU" dirty="0"/>
+              <a:t>Шейдера – загрузка, компиляция</a:t>
+            </a:r>
           </a:p>
         </p:txBody>
       </p:sp>

</xml_diff>

<commit_message>
add: more models + now in model handle material is parsing + some fixes in presentation
</commit_message>
<xml_diff>
--- a/doc/presentation.pptx
+++ b/doc/presentation.pptx
@@ -4150,7 +4150,7 @@
         </p:blipFill>
         <p:spPr>
           <a:xfrm>
-            <a:off x="6593747" y="4743062"/>
+            <a:off x="6439713" y="4743062"/>
             <a:ext cx="2170887" cy="1795850"/>
           </a:xfrm>
           <a:prstGeom prst="rect">
@@ -4188,7 +4188,7 @@
           <a:p>
             <a:r>
               <a:rPr lang="ru-RU" sz="4800" b="1" dirty="0"/>
-              <a:t>Разработка системы визуализации трехмерных сцен с помощью флгоритма трассировки лучей</a:t>
+              <a:t>Разработка системы визуализации трехмерных сцен с помощью алгоритма трассировки лучей</a:t>
             </a:r>
           </a:p>
         </p:txBody>
@@ -4249,8 +4249,8 @@
         </p:nvSpPr>
         <p:spPr>
           <a:xfrm>
-            <a:off x="86722" y="4900658"/>
-            <a:ext cx="2874556" cy="1957342"/>
+            <a:off x="86721" y="4900658"/>
+            <a:ext cx="3679935" cy="1957342"/>
           </a:xfrm>
           <a:prstGeom prst="rect">
             <a:avLst/>
@@ -4505,7 +4505,7 @@
                 </a:solidFill>
                 <a:latin typeface="Arial" panose="020B0604020202020204" pitchFamily="34" charset="0"/>
               </a:rPr>
-              <a:t>Александр ?</a:t>
+              <a:t>Александр Викторович Еналдиев</a:t>
             </a:r>
           </a:p>
           <a:p>
@@ -4544,36 +4544,6 @@
           </a:p>
         </p:txBody>
       </p:sp>
-      <p:pic>
-        <p:nvPicPr>
-          <p:cNvPr id="14" name="Picture 13">
-            <a:extLst>
-              <a:ext uri="{FF2B5EF4-FFF2-40B4-BE49-F238E27FC236}">
-                <a16:creationId xmlns:a16="http://schemas.microsoft.com/office/drawing/2014/main" id="{DA30D97E-6750-4CCD-82C8-945D90A9481F}"/>
-              </a:ext>
-            </a:extLst>
-          </p:cNvPr>
-          <p:cNvPicPr>
-            <a:picLocks noChangeAspect="1"/>
-          </p:cNvPicPr>
-          <p:nvPr/>
-        </p:nvPicPr>
-        <p:blipFill>
-          <a:blip r:embed="rId3"/>
-          <a:stretch>
-            <a:fillRect/>
-          </a:stretch>
-        </p:blipFill>
-        <p:spPr>
-          <a:xfrm>
-            <a:off x="3728985" y="4003743"/>
-            <a:ext cx="3312174" cy="1750967"/>
-          </a:xfrm>
-          <a:prstGeom prst="rect">
-            <a:avLst/>
-          </a:prstGeom>
-        </p:spPr>
-      </p:pic>
       <p:sp>
         <p:nvSpPr>
           <p:cNvPr id="15" name="TextBox 14">
@@ -4609,6 +4579,36 @@
           </a:p>
         </p:txBody>
       </p:sp>
+      <p:pic>
+        <p:nvPicPr>
+          <p:cNvPr id="6" name="Picture 5">
+            <a:extLst>
+              <a:ext uri="{FF2B5EF4-FFF2-40B4-BE49-F238E27FC236}">
+                <a16:creationId xmlns:a16="http://schemas.microsoft.com/office/drawing/2014/main" id="{F61F0C00-9BA0-435C-8595-A81260921F9B}"/>
+              </a:ext>
+            </a:extLst>
+          </p:cNvPr>
+          <p:cNvPicPr>
+            <a:picLocks noChangeAspect="1"/>
+          </p:cNvPicPr>
+          <p:nvPr/>
+        </p:nvPicPr>
+        <p:blipFill>
+          <a:blip r:embed="rId3"/>
+          <a:stretch>
+            <a:fillRect/>
+          </a:stretch>
+        </p:blipFill>
+        <p:spPr>
+          <a:xfrm>
+            <a:off x="3677410" y="3927168"/>
+            <a:ext cx="3089945" cy="1631787"/>
+          </a:xfrm>
+          <a:prstGeom prst="rect">
+            <a:avLst/>
+          </a:prstGeom>
+        </p:spPr>
+      </p:pic>
     </p:spTree>
     <p:extLst>
       <p:ext uri="{BB962C8B-B14F-4D97-AF65-F5344CB8AC3E}">
@@ -4996,8 +4996,8 @@
         </p:nvSpPr>
         <p:spPr>
           <a:xfrm>
-            <a:off x="518390" y="2370275"/>
-            <a:ext cx="6175200" cy="4351200"/>
+            <a:off x="399501" y="2502400"/>
+            <a:ext cx="6001299" cy="2344338"/>
           </a:xfrm>
           <a:prstGeom prst="rect">
             <a:avLst/>

</xml_diff>